<commit_message>
BPO added quick dial
</commit_message>
<xml_diff>
--- a/Automobile Maintenance App (1).pptx
+++ b/Automobile Maintenance App (1).pptx
@@ -6,17 +6,22 @@
   </p:sldMasterIdLst>
   <p:sldIdLst>
     <p:sldId id="256" r:id="rId2"/>
-    <p:sldId id="257" r:id="rId3"/>
-    <p:sldId id="258" r:id="rId4"/>
-    <p:sldId id="259" r:id="rId5"/>
-    <p:sldId id="260" r:id="rId6"/>
-    <p:sldId id="261" r:id="rId7"/>
-    <p:sldId id="262" r:id="rId8"/>
-    <p:sldId id="263" r:id="rId9"/>
-    <p:sldId id="264" r:id="rId10"/>
-    <p:sldId id="265" r:id="rId11"/>
-    <p:sldId id="266" r:id="rId12"/>
-    <p:sldId id="267" r:id="rId13"/>
+    <p:sldId id="272" r:id="rId3"/>
+    <p:sldId id="268" r:id="rId4"/>
+    <p:sldId id="257" r:id="rId5"/>
+    <p:sldId id="258" r:id="rId6"/>
+    <p:sldId id="259" r:id="rId7"/>
+    <p:sldId id="260" r:id="rId8"/>
+    <p:sldId id="261" r:id="rId9"/>
+    <p:sldId id="262" r:id="rId10"/>
+    <p:sldId id="263" r:id="rId11"/>
+    <p:sldId id="264" r:id="rId12"/>
+    <p:sldId id="265" r:id="rId13"/>
+    <p:sldId id="266" r:id="rId14"/>
+    <p:sldId id="269" r:id="rId15"/>
+    <p:sldId id="267" r:id="rId16"/>
+    <p:sldId id="270" r:id="rId17"/>
+    <p:sldId id="271" r:id="rId18"/>
   </p:sldIdLst>
   <p:sldSz cx="9144000" cy="6858000" type="screen4x3"/>
   <p:notesSz cx="6858000" cy="9144000"/>
@@ -299,7 +304,7 @@
           <a:p>
             <a:fld id="{5D5F8ADE-E369-46BB-8A9A-AC386C51D458}" type="datetimeFigureOut">
               <a:rPr lang="en-US" smtClean="0"/>
-              <a:t>6/27/2015</a:t>
+              <a:t>7/1/2015</a:t>
             </a:fld>
             <a:endParaRPr lang="en-US"/>
           </a:p>
@@ -469,7 +474,7 @@
           <a:p>
             <a:fld id="{5D5F8ADE-E369-46BB-8A9A-AC386C51D458}" type="datetimeFigureOut">
               <a:rPr lang="en-US" smtClean="0"/>
-              <a:t>6/27/2015</a:t>
+              <a:t>7/1/2015</a:t>
             </a:fld>
             <a:endParaRPr lang="en-US"/>
           </a:p>
@@ -649,7 +654,7 @@
           <a:p>
             <a:fld id="{5D5F8ADE-E369-46BB-8A9A-AC386C51D458}" type="datetimeFigureOut">
               <a:rPr lang="en-US" smtClean="0"/>
-              <a:t>6/27/2015</a:t>
+              <a:t>7/1/2015</a:t>
             </a:fld>
             <a:endParaRPr lang="en-US"/>
           </a:p>
@@ -819,7 +824,7 @@
           <a:p>
             <a:fld id="{5D5F8ADE-E369-46BB-8A9A-AC386C51D458}" type="datetimeFigureOut">
               <a:rPr lang="en-US" smtClean="0"/>
-              <a:t>6/27/2015</a:t>
+              <a:t>7/1/2015</a:t>
             </a:fld>
             <a:endParaRPr lang="en-US"/>
           </a:p>
@@ -1065,7 +1070,7 @@
           <a:p>
             <a:fld id="{5D5F8ADE-E369-46BB-8A9A-AC386C51D458}" type="datetimeFigureOut">
               <a:rPr lang="en-US" smtClean="0"/>
-              <a:t>6/27/2015</a:t>
+              <a:t>7/1/2015</a:t>
             </a:fld>
             <a:endParaRPr lang="en-US"/>
           </a:p>
@@ -1353,7 +1358,7 @@
           <a:p>
             <a:fld id="{5D5F8ADE-E369-46BB-8A9A-AC386C51D458}" type="datetimeFigureOut">
               <a:rPr lang="en-US" smtClean="0"/>
-              <a:t>6/27/2015</a:t>
+              <a:t>7/1/2015</a:t>
             </a:fld>
             <a:endParaRPr lang="en-US"/>
           </a:p>
@@ -1775,7 +1780,7 @@
           <a:p>
             <a:fld id="{5D5F8ADE-E369-46BB-8A9A-AC386C51D458}" type="datetimeFigureOut">
               <a:rPr lang="en-US" smtClean="0"/>
-              <a:t>6/27/2015</a:t>
+              <a:t>7/1/2015</a:t>
             </a:fld>
             <a:endParaRPr lang="en-US"/>
           </a:p>
@@ -1893,7 +1898,7 @@
           <a:p>
             <a:fld id="{5D5F8ADE-E369-46BB-8A9A-AC386C51D458}" type="datetimeFigureOut">
               <a:rPr lang="en-US" smtClean="0"/>
-              <a:t>6/27/2015</a:t>
+              <a:t>7/1/2015</a:t>
             </a:fld>
             <a:endParaRPr lang="en-US"/>
           </a:p>
@@ -1988,7 +1993,7 @@
           <a:p>
             <a:fld id="{5D5F8ADE-E369-46BB-8A9A-AC386C51D458}" type="datetimeFigureOut">
               <a:rPr lang="en-US" smtClean="0"/>
-              <a:t>6/27/2015</a:t>
+              <a:t>7/1/2015</a:t>
             </a:fld>
             <a:endParaRPr lang="en-US"/>
           </a:p>
@@ -2265,7 +2270,7 @@
           <a:p>
             <a:fld id="{5D5F8ADE-E369-46BB-8A9A-AC386C51D458}" type="datetimeFigureOut">
               <a:rPr lang="en-US" smtClean="0"/>
-              <a:t>6/27/2015</a:t>
+              <a:t>7/1/2015</a:t>
             </a:fld>
             <a:endParaRPr lang="en-US"/>
           </a:p>
@@ -2518,7 +2523,7 @@
           <a:p>
             <a:fld id="{5D5F8ADE-E369-46BB-8A9A-AC386C51D458}" type="datetimeFigureOut">
               <a:rPr lang="en-US" smtClean="0"/>
-              <a:t>6/27/2015</a:t>
+              <a:t>7/1/2015</a:t>
             </a:fld>
             <a:endParaRPr lang="en-US"/>
           </a:p>
@@ -2731,7 +2736,7 @@
           <a:p>
             <a:fld id="{5D5F8ADE-E369-46BB-8A9A-AC386C51D458}" type="datetimeFigureOut">
               <a:rPr lang="en-US" smtClean="0"/>
-              <a:t>6/27/2015</a:t>
+              <a:t>7/1/2015</a:t>
             </a:fld>
             <a:endParaRPr lang="en-US"/>
           </a:p>
@@ -3289,19 +3294,14 @@
             <p:ph type="title"/>
           </p:nvPr>
         </p:nvSpPr>
-        <p:spPr>
-          <a:xfrm>
-            <a:off x="457200" y="228600"/>
-            <a:ext cx="8229600" cy="1143000"/>
-          </a:xfrm>
-        </p:spPr>
+        <p:spPr/>
         <p:txBody>
           <a:bodyPr/>
           <a:lstStyle/>
           <a:p>
             <a:r>
               <a:rPr lang="en-US" dirty="0" smtClean="0"/>
-              <a:t>Competitors</a:t>
+              <a:t>App Demographic</a:t>
             </a:r>
             <a:endParaRPr lang="en-US" dirty="0"/>
           </a:p>
@@ -3319,73 +3319,31 @@
         </p:nvSpPr>
         <p:spPr>
           <a:xfrm>
-            <a:off x="457200" y="2971800"/>
-            <a:ext cx="8229600" cy="3429000"/>
-          </a:xfrm>
-        </p:spPr>
-        <p:txBody>
-          <a:bodyPr>
-            <a:normAutofit/>
-          </a:bodyPr>
-          <a:lstStyle/>
-          <a:p>
-            <a:r>
-              <a:rPr lang="en-US" dirty="0" err="1" smtClean="0"/>
-              <a:t>aCar</a:t>
-            </a:r>
-            <a:endParaRPr lang="en-US" dirty="0" smtClean="0"/>
-          </a:p>
-          <a:p>
-            <a:pPr lvl="0"/>
-            <a:r>
-              <a:rPr lang="en-US" dirty="0"/>
-              <a:t>Car Maintenance Reminder Lite</a:t>
-            </a:r>
-          </a:p>
-          <a:p>
-            <a:pPr lvl="0"/>
-            <a:r>
-              <a:rPr lang="en-US" dirty="0" err="1"/>
-              <a:t>CarPros</a:t>
-            </a:r>
-            <a:r>
-              <a:rPr lang="en-US" dirty="0"/>
-              <a:t> – Car Management</a:t>
-            </a:r>
-          </a:p>
-          <a:p>
-            <a:pPr lvl="0"/>
-            <a:r>
-              <a:rPr lang="en-US" dirty="0" err="1"/>
-              <a:t>Carango</a:t>
-            </a:r>
-            <a:r>
-              <a:rPr lang="en-US" dirty="0"/>
-              <a:t> – Car Management</a:t>
-            </a:r>
-          </a:p>
-          <a:p>
-            <a:pPr lvl="0"/>
-            <a:r>
-              <a:rPr lang="en-US" dirty="0" err="1"/>
-              <a:t>Vehi</a:t>
-            </a:r>
-            <a:r>
-              <a:rPr lang="en-US" dirty="0"/>
-              <a:t> Car – Car Maintenance</a:t>
-            </a:r>
-          </a:p>
-          <a:p>
-            <a:pPr marL="0" indent="0">
-              <a:buNone/>
-            </a:pPr>
+            <a:off x="457200" y="1600201"/>
+            <a:ext cx="8229600" cy="2590800"/>
+          </a:xfrm>
+        </p:spPr>
+        <p:txBody>
+          <a:bodyPr/>
+          <a:lstStyle/>
+          <a:p>
+            <a:r>
+              <a:rPr lang="en-US" dirty="0" smtClean="0"/>
+              <a:t>Huge Demographic</a:t>
+            </a:r>
+          </a:p>
+          <a:p>
+            <a:r>
+              <a:rPr lang="en-US" dirty="0" smtClean="0"/>
+              <a:t>Basically anyone that wished to keep their automobile in good working order, and wishes to save money on repair bills.</a:t>
+            </a:r>
             <a:endParaRPr lang="en-US" dirty="0"/>
           </a:p>
         </p:txBody>
       </p:sp>
       <p:pic>
         <p:nvPicPr>
-          <p:cNvPr id="5" name="Picture 4"/>
+          <p:cNvPr id="4" name="Picture 3"/>
           <p:cNvPicPr>
             <a:picLocks noChangeAspect="1"/>
           </p:cNvPicPr>
@@ -3405,8 +3363,8 @@
         </p:blipFill>
         <p:spPr>
           <a:xfrm>
-            <a:off x="3283416" y="1515233"/>
-            <a:ext cx="2438400" cy="1227967"/>
+            <a:off x="2641705" y="3684226"/>
+            <a:ext cx="4298741" cy="3211702"/>
           </a:xfrm>
           <a:prstGeom prst="rect">
             <a:avLst/>
@@ -3416,7 +3374,7 @@
     </p:spTree>
     <p:extLst>
       <p:ext uri="{BB962C8B-B14F-4D97-AF65-F5344CB8AC3E}">
-        <p14:creationId xmlns:p14="http://schemas.microsoft.com/office/powerpoint/2010/main" val="1361254350"/>
+        <p14:creationId xmlns:p14="http://schemas.microsoft.com/office/powerpoint/2010/main" val="4147903026"/>
       </p:ext>
     </p:extLst>
   </p:cSld>
@@ -3460,7 +3418,7 @@
           <a:p>
             <a:r>
               <a:rPr lang="en-US" dirty="0" smtClean="0"/>
-              <a:t>How Our App is Better</a:t>
+              <a:t>Typical User	</a:t>
             </a:r>
             <a:endParaRPr lang="en-US" dirty="0"/>
           </a:p>
@@ -3479,7 +3437,7 @@
         <p:spPr>
           <a:xfrm>
             <a:off x="457200" y="1600201"/>
-            <a:ext cx="8229600" cy="2667000"/>
+            <a:ext cx="8229600" cy="2514600"/>
           </a:xfrm>
         </p:spPr>
         <p:txBody>
@@ -3490,9 +3448,26 @@
               <a:buNone/>
             </a:pPr>
             <a:r>
+              <a:rPr lang="en-US" dirty="0" smtClean="0"/>
+              <a:t>Mike </a:t>
+            </a:r>
+            <a:r>
               <a:rPr lang="en-US" dirty="0"/>
-              <a:t>There are several apps in the Pay Store that provide similar features.  Automobile Maintenance App will provide many of the features of these competitor apps with a better user interface. </a:t>
-            </a:r>
+              <a:t>is a hypothetical car owner.  He is proud of this 2010 Chevy </a:t>
+            </a:r>
+            <a:r>
+              <a:rPr lang="en-US" dirty="0" err="1"/>
+              <a:t>Comaro</a:t>
+            </a:r>
+            <a:r>
+              <a:rPr lang="en-US" dirty="0"/>
+              <a:t> and wants to keep it in perfect running order.  He would also like to save as much as possible on his auto repair bills.</a:t>
+            </a:r>
+          </a:p>
+          <a:p>
+            <a:pPr marL="0" indent="0">
+              <a:buNone/>
+            </a:pPr>
             <a:endParaRPr lang="en-US" dirty="0"/>
           </a:p>
         </p:txBody>
@@ -3519,8 +3494,8 @@
         </p:blipFill>
         <p:spPr>
           <a:xfrm>
-            <a:off x="3886200" y="4640272"/>
-            <a:ext cx="1371600" cy="1371600"/>
+            <a:off x="3509962" y="4527958"/>
+            <a:ext cx="2124075" cy="1104900"/>
           </a:xfrm>
           <a:prstGeom prst="rect">
             <a:avLst/>
@@ -3530,7 +3505,7 @@
     </p:spTree>
     <p:extLst>
       <p:ext uri="{BB962C8B-B14F-4D97-AF65-F5344CB8AC3E}">
-        <p14:creationId xmlns:p14="http://schemas.microsoft.com/office/powerpoint/2010/main" val="257744580"/>
+        <p14:creationId xmlns:p14="http://schemas.microsoft.com/office/powerpoint/2010/main" val="3413720117"/>
       </p:ext>
     </p:extLst>
   </p:cSld>
@@ -3567,6 +3542,415 @@
             <p:ph type="title"/>
           </p:nvPr>
         </p:nvSpPr>
+        <p:spPr>
+          <a:xfrm>
+            <a:off x="457200" y="228600"/>
+            <a:ext cx="8229600" cy="1143000"/>
+          </a:xfrm>
+        </p:spPr>
+        <p:txBody>
+          <a:bodyPr/>
+          <a:lstStyle/>
+          <a:p>
+            <a:r>
+              <a:rPr lang="en-US" dirty="0" smtClean="0"/>
+              <a:t>Competitors</a:t>
+            </a:r>
+            <a:endParaRPr lang="en-US" dirty="0"/>
+          </a:p>
+        </p:txBody>
+      </p:sp>
+      <p:sp>
+        <p:nvSpPr>
+          <p:cNvPr id="3" name="Content Placeholder 2"/>
+          <p:cNvSpPr>
+            <a:spLocks noGrp="1"/>
+          </p:cNvSpPr>
+          <p:nvPr>
+            <p:ph idx="1"/>
+          </p:nvPr>
+        </p:nvSpPr>
+        <p:spPr>
+          <a:xfrm>
+            <a:off x="457200" y="2971800"/>
+            <a:ext cx="8229600" cy="3429000"/>
+          </a:xfrm>
+        </p:spPr>
+        <p:txBody>
+          <a:bodyPr>
+            <a:normAutofit/>
+          </a:bodyPr>
+          <a:lstStyle/>
+          <a:p>
+            <a:r>
+              <a:rPr lang="en-US" dirty="0" err="1" smtClean="0"/>
+              <a:t>aCar</a:t>
+            </a:r>
+            <a:endParaRPr lang="en-US" dirty="0" smtClean="0"/>
+          </a:p>
+          <a:p>
+            <a:pPr lvl="0"/>
+            <a:r>
+              <a:rPr lang="en-US" dirty="0"/>
+              <a:t>Car Maintenance Reminder Lite</a:t>
+            </a:r>
+          </a:p>
+          <a:p>
+            <a:pPr lvl="0"/>
+            <a:r>
+              <a:rPr lang="en-US" dirty="0" err="1"/>
+              <a:t>CarPros</a:t>
+            </a:r>
+            <a:r>
+              <a:rPr lang="en-US" dirty="0"/>
+              <a:t> – Car Management</a:t>
+            </a:r>
+          </a:p>
+          <a:p>
+            <a:pPr lvl="0"/>
+            <a:r>
+              <a:rPr lang="en-US" dirty="0" err="1"/>
+              <a:t>Carango</a:t>
+            </a:r>
+            <a:r>
+              <a:rPr lang="en-US" dirty="0"/>
+              <a:t> – Car Management</a:t>
+            </a:r>
+          </a:p>
+          <a:p>
+            <a:pPr lvl="0"/>
+            <a:r>
+              <a:rPr lang="en-US" dirty="0" err="1"/>
+              <a:t>Vehi</a:t>
+            </a:r>
+            <a:r>
+              <a:rPr lang="en-US" dirty="0"/>
+              <a:t> Car – Car Maintenance</a:t>
+            </a:r>
+          </a:p>
+          <a:p>
+            <a:pPr marL="0" indent="0">
+              <a:buNone/>
+            </a:pPr>
+            <a:endParaRPr lang="en-US" dirty="0"/>
+          </a:p>
+        </p:txBody>
+      </p:sp>
+      <p:pic>
+        <p:nvPicPr>
+          <p:cNvPr id="5" name="Picture 4"/>
+          <p:cNvPicPr>
+            <a:picLocks noChangeAspect="1"/>
+          </p:cNvPicPr>
+          <p:nvPr/>
+        </p:nvPicPr>
+        <p:blipFill>
+          <a:blip r:embed="rId2">
+            <a:extLst>
+              <a:ext uri="{28A0092B-C50C-407E-A947-70E740481C1C}">
+                <a14:useLocalDpi xmlns:a14="http://schemas.microsoft.com/office/drawing/2010/main" val="0"/>
+              </a:ext>
+            </a:extLst>
+          </a:blip>
+          <a:stretch>
+            <a:fillRect/>
+          </a:stretch>
+        </p:blipFill>
+        <p:spPr>
+          <a:xfrm>
+            <a:off x="3283416" y="1515233"/>
+            <a:ext cx="2438400" cy="1227967"/>
+          </a:xfrm>
+          <a:prstGeom prst="rect">
+            <a:avLst/>
+          </a:prstGeom>
+        </p:spPr>
+      </p:pic>
+    </p:spTree>
+    <p:extLst>
+      <p:ext uri="{BB962C8B-B14F-4D97-AF65-F5344CB8AC3E}">
+        <p14:creationId xmlns:p14="http://schemas.microsoft.com/office/powerpoint/2010/main" val="1361254350"/>
+      </p:ext>
+    </p:extLst>
+  </p:cSld>
+  <p:clrMapOvr>
+    <a:masterClrMapping/>
+  </p:clrMapOvr>
+</p:sld>
+</file>
+
+<file path=ppt/slides/slide13.xml><?xml version="1.0" encoding="utf-8"?>
+<p:sld xmlns:a="http://schemas.openxmlformats.org/drawingml/2006/main" xmlns:r="http://schemas.openxmlformats.org/officeDocument/2006/relationships" xmlns:p="http://schemas.openxmlformats.org/presentationml/2006/main">
+  <p:cSld>
+    <p:spTree>
+      <p:nvGrpSpPr>
+        <p:cNvPr id="1" name=""/>
+        <p:cNvGrpSpPr/>
+        <p:nvPr/>
+      </p:nvGrpSpPr>
+      <p:grpSpPr>
+        <a:xfrm>
+          <a:off x="0" y="0"/>
+          <a:ext cx="0" cy="0"/>
+          <a:chOff x="0" y="0"/>
+          <a:chExt cx="0" cy="0"/>
+        </a:xfrm>
+      </p:grpSpPr>
+      <p:sp>
+        <p:nvSpPr>
+          <p:cNvPr id="2" name="Title 1"/>
+          <p:cNvSpPr>
+            <a:spLocks noGrp="1"/>
+          </p:cNvSpPr>
+          <p:nvPr>
+            <p:ph type="title"/>
+          </p:nvPr>
+        </p:nvSpPr>
+        <p:spPr/>
+        <p:txBody>
+          <a:bodyPr/>
+          <a:lstStyle/>
+          <a:p>
+            <a:r>
+              <a:rPr lang="en-US" dirty="0" smtClean="0"/>
+              <a:t>How Our App is Better</a:t>
+            </a:r>
+            <a:endParaRPr lang="en-US" dirty="0"/>
+          </a:p>
+        </p:txBody>
+      </p:sp>
+      <p:sp>
+        <p:nvSpPr>
+          <p:cNvPr id="3" name="Content Placeholder 2"/>
+          <p:cNvSpPr>
+            <a:spLocks noGrp="1"/>
+          </p:cNvSpPr>
+          <p:nvPr>
+            <p:ph idx="1"/>
+          </p:nvPr>
+        </p:nvSpPr>
+        <p:spPr>
+          <a:xfrm>
+            <a:off x="457200" y="1600201"/>
+            <a:ext cx="8229600" cy="2667000"/>
+          </a:xfrm>
+        </p:spPr>
+        <p:txBody>
+          <a:bodyPr/>
+          <a:lstStyle/>
+          <a:p>
+            <a:pPr marL="0" indent="0">
+              <a:buNone/>
+            </a:pPr>
+            <a:r>
+              <a:rPr lang="en-US" dirty="0"/>
+              <a:t>There are several apps in the Pay Store that provide similar features.  Automobile Maintenance App will provide many of the features of these competitor apps with a better user interface. </a:t>
+            </a:r>
+          </a:p>
+        </p:txBody>
+      </p:sp>
+      <p:pic>
+        <p:nvPicPr>
+          <p:cNvPr id="4" name="Picture 3"/>
+          <p:cNvPicPr>
+            <a:picLocks noChangeAspect="1"/>
+          </p:cNvPicPr>
+          <p:nvPr/>
+        </p:nvPicPr>
+        <p:blipFill>
+          <a:blip r:embed="rId2">
+            <a:extLst>
+              <a:ext uri="{28A0092B-C50C-407E-A947-70E740481C1C}">
+                <a14:useLocalDpi xmlns:a14="http://schemas.microsoft.com/office/drawing/2010/main" val="0"/>
+              </a:ext>
+            </a:extLst>
+          </a:blip>
+          <a:stretch>
+            <a:fillRect/>
+          </a:stretch>
+        </p:blipFill>
+        <p:spPr>
+          <a:xfrm>
+            <a:off x="3886200" y="4640272"/>
+            <a:ext cx="1371600" cy="1371600"/>
+          </a:xfrm>
+          <a:prstGeom prst="rect">
+            <a:avLst/>
+          </a:prstGeom>
+        </p:spPr>
+      </p:pic>
+    </p:spTree>
+    <p:extLst>
+      <p:ext uri="{BB962C8B-B14F-4D97-AF65-F5344CB8AC3E}">
+        <p14:creationId xmlns:p14="http://schemas.microsoft.com/office/powerpoint/2010/main" val="257744580"/>
+      </p:ext>
+    </p:extLst>
+  </p:cSld>
+  <p:clrMapOvr>
+    <a:masterClrMapping/>
+  </p:clrMapOvr>
+</p:sld>
+</file>
+
+<file path=ppt/slides/slide14.xml><?xml version="1.0" encoding="utf-8"?>
+<p:sld xmlns:a="http://schemas.openxmlformats.org/drawingml/2006/main" xmlns:r="http://schemas.openxmlformats.org/officeDocument/2006/relationships" xmlns:p="http://schemas.openxmlformats.org/presentationml/2006/main">
+  <p:cSld>
+    <p:spTree>
+      <p:nvGrpSpPr>
+        <p:cNvPr id="1" name=""/>
+        <p:cNvGrpSpPr/>
+        <p:nvPr/>
+      </p:nvGrpSpPr>
+      <p:grpSpPr>
+        <a:xfrm>
+          <a:off x="0" y="0"/>
+          <a:ext cx="0" cy="0"/>
+          <a:chOff x="0" y="0"/>
+          <a:chExt cx="0" cy="0"/>
+        </a:xfrm>
+      </p:grpSpPr>
+      <p:sp>
+        <p:nvSpPr>
+          <p:cNvPr id="2" name="Title 1"/>
+          <p:cNvSpPr>
+            <a:spLocks noGrp="1"/>
+          </p:cNvSpPr>
+          <p:nvPr>
+            <p:ph type="title"/>
+          </p:nvPr>
+        </p:nvSpPr>
+        <p:spPr/>
+        <p:txBody>
+          <a:bodyPr/>
+          <a:lstStyle/>
+          <a:p>
+            <a:r>
+              <a:rPr lang="en-US" dirty="0" smtClean="0"/>
+              <a:t>Technology</a:t>
+            </a:r>
+            <a:endParaRPr lang="en-US" dirty="0"/>
+          </a:p>
+        </p:txBody>
+      </p:sp>
+      <p:sp>
+        <p:nvSpPr>
+          <p:cNvPr id="3" name="Content Placeholder 2"/>
+          <p:cNvSpPr>
+            <a:spLocks noGrp="1"/>
+          </p:cNvSpPr>
+          <p:nvPr>
+            <p:ph idx="1"/>
+          </p:nvPr>
+        </p:nvSpPr>
+        <p:spPr>
+          <a:xfrm>
+            <a:off x="457200" y="2362199"/>
+            <a:ext cx="8229600" cy="3124201"/>
+          </a:xfrm>
+        </p:spPr>
+        <p:txBody>
+          <a:bodyPr>
+            <a:normAutofit/>
+          </a:bodyPr>
+          <a:lstStyle/>
+          <a:p>
+            <a:r>
+              <a:rPr lang="en-US" dirty="0" smtClean="0"/>
+              <a:t>Android Studio</a:t>
+            </a:r>
+          </a:p>
+          <a:p>
+            <a:r>
+              <a:rPr lang="en-US" dirty="0" smtClean="0"/>
+              <a:t>Android SDK</a:t>
+            </a:r>
+          </a:p>
+          <a:p>
+            <a:r>
+              <a:rPr lang="en-US" dirty="0" err="1" smtClean="0"/>
+              <a:t>ListViews</a:t>
+            </a:r>
+            <a:endParaRPr lang="en-US" dirty="0" smtClean="0"/>
+          </a:p>
+          <a:p>
+            <a:r>
+              <a:rPr lang="en-US" dirty="0" smtClean="0"/>
+              <a:t>Default Android Phone Dialer</a:t>
+            </a:r>
+            <a:endParaRPr lang="en-US" dirty="0"/>
+          </a:p>
+        </p:txBody>
+      </p:sp>
+      <p:pic>
+        <p:nvPicPr>
+          <p:cNvPr id="4" name="Picture 3"/>
+          <p:cNvPicPr>
+            <a:picLocks noChangeAspect="1"/>
+          </p:cNvPicPr>
+          <p:nvPr/>
+        </p:nvPicPr>
+        <p:blipFill>
+          <a:blip r:embed="rId2">
+            <a:extLst>
+              <a:ext uri="{28A0092B-C50C-407E-A947-70E740481C1C}">
+                <a14:useLocalDpi xmlns:a14="http://schemas.microsoft.com/office/drawing/2010/main" val="0"/>
+              </a:ext>
+            </a:extLst>
+          </a:blip>
+          <a:stretch>
+            <a:fillRect/>
+          </a:stretch>
+        </p:blipFill>
+        <p:spPr>
+          <a:xfrm>
+            <a:off x="7010400" y="1295400"/>
+            <a:ext cx="1257300" cy="962025"/>
+          </a:xfrm>
+          <a:prstGeom prst="rect">
+            <a:avLst/>
+          </a:prstGeom>
+        </p:spPr>
+      </p:pic>
+    </p:spTree>
+    <p:extLst>
+      <p:ext uri="{BB962C8B-B14F-4D97-AF65-F5344CB8AC3E}">
+        <p14:creationId xmlns:p14="http://schemas.microsoft.com/office/powerpoint/2010/main" val="1628067092"/>
+      </p:ext>
+    </p:extLst>
+  </p:cSld>
+  <p:clrMapOvr>
+    <a:masterClrMapping/>
+  </p:clrMapOvr>
+</p:sld>
+</file>
+
+<file path=ppt/slides/slide15.xml><?xml version="1.0" encoding="utf-8"?>
+<p:sld xmlns:a="http://schemas.openxmlformats.org/drawingml/2006/main" xmlns:r="http://schemas.openxmlformats.org/officeDocument/2006/relationships" xmlns:p="http://schemas.openxmlformats.org/presentationml/2006/main">
+  <p:cSld>
+    <p:spTree>
+      <p:nvGrpSpPr>
+        <p:cNvPr id="1" name=""/>
+        <p:cNvGrpSpPr/>
+        <p:nvPr/>
+      </p:nvGrpSpPr>
+      <p:grpSpPr>
+        <a:xfrm>
+          <a:off x="0" y="0"/>
+          <a:ext cx="0" cy="0"/>
+          <a:chOff x="0" y="0"/>
+          <a:chExt cx="0" cy="0"/>
+        </a:xfrm>
+      </p:grpSpPr>
+      <p:sp>
+        <p:nvSpPr>
+          <p:cNvPr id="2" name="Title 1"/>
+          <p:cNvSpPr>
+            <a:spLocks noGrp="1"/>
+          </p:cNvSpPr>
+          <p:nvPr>
+            <p:ph type="title"/>
+          </p:nvPr>
+        </p:nvSpPr>
         <p:spPr/>
         <p:txBody>
           <a:bodyPr/>
@@ -3662,6 +4046,239 @@
     <p:extLst>
       <p:ext uri="{BB962C8B-B14F-4D97-AF65-F5344CB8AC3E}">
         <p14:creationId xmlns:p14="http://schemas.microsoft.com/office/powerpoint/2010/main" val="3792944894"/>
+      </p:ext>
+    </p:extLst>
+  </p:cSld>
+  <p:clrMapOvr>
+    <a:masterClrMapping/>
+  </p:clrMapOvr>
+</p:sld>
+</file>
+
+<file path=ppt/slides/slide16.xml><?xml version="1.0" encoding="utf-8"?>
+<p:sld xmlns:a="http://schemas.openxmlformats.org/drawingml/2006/main" xmlns:r="http://schemas.openxmlformats.org/officeDocument/2006/relationships" xmlns:p="http://schemas.openxmlformats.org/presentationml/2006/main">
+  <p:cSld>
+    <p:spTree>
+      <p:nvGrpSpPr>
+        <p:cNvPr id="1" name=""/>
+        <p:cNvGrpSpPr/>
+        <p:nvPr/>
+      </p:nvGrpSpPr>
+      <p:grpSpPr>
+        <a:xfrm>
+          <a:off x="0" y="0"/>
+          <a:ext cx="0" cy="0"/>
+          <a:chOff x="0" y="0"/>
+          <a:chExt cx="0" cy="0"/>
+        </a:xfrm>
+      </p:grpSpPr>
+      <p:sp>
+        <p:nvSpPr>
+          <p:cNvPr id="2" name="Title 1"/>
+          <p:cNvSpPr>
+            <a:spLocks noGrp="1"/>
+          </p:cNvSpPr>
+          <p:nvPr>
+            <p:ph type="title"/>
+          </p:nvPr>
+        </p:nvSpPr>
+        <p:spPr/>
+        <p:txBody>
+          <a:bodyPr/>
+          <a:lstStyle/>
+          <a:p>
+            <a:r>
+              <a:rPr lang="en-US" dirty="0" smtClean="0"/>
+              <a:t>Status of App</a:t>
+            </a:r>
+            <a:endParaRPr lang="en-US" dirty="0"/>
+          </a:p>
+        </p:txBody>
+      </p:sp>
+      <p:sp>
+        <p:nvSpPr>
+          <p:cNvPr id="3" name="Content Placeholder 2"/>
+          <p:cNvSpPr>
+            <a:spLocks noGrp="1"/>
+          </p:cNvSpPr>
+          <p:nvPr>
+            <p:ph idx="1"/>
+          </p:nvPr>
+        </p:nvSpPr>
+        <p:spPr>
+          <a:xfrm>
+            <a:off x="457200" y="1600201"/>
+            <a:ext cx="8229600" cy="1447800"/>
+          </a:xfrm>
+        </p:spPr>
+        <p:txBody>
+          <a:bodyPr/>
+          <a:lstStyle/>
+          <a:p>
+            <a:pPr marL="0" indent="0">
+              <a:buNone/>
+            </a:pPr>
+            <a:r>
+              <a:rPr lang="en-US" dirty="0" smtClean="0"/>
+              <a:t>We have created a working prototype of our app with development scheduled to begin soon.</a:t>
+            </a:r>
+            <a:endParaRPr lang="en-US" dirty="0"/>
+          </a:p>
+        </p:txBody>
+      </p:sp>
+      <p:pic>
+        <p:nvPicPr>
+          <p:cNvPr id="4" name="Picture 3"/>
+          <p:cNvPicPr>
+            <a:picLocks noChangeAspect="1"/>
+          </p:cNvPicPr>
+          <p:nvPr/>
+        </p:nvPicPr>
+        <p:blipFill>
+          <a:blip r:embed="rId2">
+            <a:extLst>
+              <a:ext uri="{28A0092B-C50C-407E-A947-70E740481C1C}">
+                <a14:useLocalDpi xmlns:a14="http://schemas.microsoft.com/office/drawing/2010/main" val="0"/>
+              </a:ext>
+            </a:extLst>
+          </a:blip>
+          <a:stretch>
+            <a:fillRect/>
+          </a:stretch>
+        </p:blipFill>
+        <p:spPr>
+          <a:xfrm>
+            <a:off x="2898940" y="2971800"/>
+            <a:ext cx="3305175" cy="3295650"/>
+          </a:xfrm>
+          <a:prstGeom prst="rect">
+            <a:avLst/>
+          </a:prstGeom>
+        </p:spPr>
+      </p:pic>
+    </p:spTree>
+    <p:extLst>
+      <p:ext uri="{BB962C8B-B14F-4D97-AF65-F5344CB8AC3E}">
+        <p14:creationId xmlns:p14="http://schemas.microsoft.com/office/powerpoint/2010/main" val="3725609317"/>
+      </p:ext>
+    </p:extLst>
+  </p:cSld>
+  <p:clrMapOvr>
+    <a:masterClrMapping/>
+  </p:clrMapOvr>
+</p:sld>
+</file>
+
+<file path=ppt/slides/slide17.xml><?xml version="1.0" encoding="utf-8"?>
+<p:sld xmlns:a="http://schemas.openxmlformats.org/drawingml/2006/main" xmlns:r="http://schemas.openxmlformats.org/officeDocument/2006/relationships" xmlns:p="http://schemas.openxmlformats.org/presentationml/2006/main">
+  <p:cSld>
+    <p:spTree>
+      <p:nvGrpSpPr>
+        <p:cNvPr id="1" name=""/>
+        <p:cNvGrpSpPr/>
+        <p:nvPr/>
+      </p:nvGrpSpPr>
+      <p:grpSpPr>
+        <a:xfrm>
+          <a:off x="0" y="0"/>
+          <a:ext cx="0" cy="0"/>
+          <a:chOff x="0" y="0"/>
+          <a:chExt cx="0" cy="0"/>
+        </a:xfrm>
+      </p:grpSpPr>
+      <p:sp>
+        <p:nvSpPr>
+          <p:cNvPr id="2" name="Title 1"/>
+          <p:cNvSpPr>
+            <a:spLocks noGrp="1"/>
+          </p:cNvSpPr>
+          <p:nvPr>
+            <p:ph type="title"/>
+          </p:nvPr>
+        </p:nvSpPr>
+        <p:spPr/>
+        <p:txBody>
+          <a:bodyPr/>
+          <a:lstStyle/>
+          <a:p>
+            <a:r>
+              <a:rPr lang="en-US" dirty="0" smtClean="0"/>
+              <a:t>Challenges</a:t>
+            </a:r>
+            <a:endParaRPr lang="en-US" dirty="0"/>
+          </a:p>
+        </p:txBody>
+      </p:sp>
+      <p:sp>
+        <p:nvSpPr>
+          <p:cNvPr id="3" name="Content Placeholder 2"/>
+          <p:cNvSpPr>
+            <a:spLocks noGrp="1"/>
+          </p:cNvSpPr>
+          <p:nvPr>
+            <p:ph idx="1"/>
+          </p:nvPr>
+        </p:nvSpPr>
+        <p:spPr>
+          <a:xfrm>
+            <a:off x="457200" y="4343400"/>
+            <a:ext cx="8229600" cy="1981200"/>
+          </a:xfrm>
+        </p:spPr>
+        <p:txBody>
+          <a:bodyPr>
+            <a:normAutofit/>
+          </a:bodyPr>
+          <a:lstStyle/>
+          <a:p>
+            <a:r>
+              <a:rPr lang="en-US" dirty="0" smtClean="0"/>
+              <a:t>Working within a team</a:t>
+            </a:r>
+          </a:p>
+          <a:p>
+            <a:r>
+              <a:rPr lang="en-US" dirty="0" smtClean="0"/>
+              <a:t>Short time frame</a:t>
+            </a:r>
+            <a:endParaRPr lang="en-US" dirty="0"/>
+          </a:p>
+        </p:txBody>
+      </p:sp>
+      <p:pic>
+        <p:nvPicPr>
+          <p:cNvPr id="4" name="Picture 3"/>
+          <p:cNvPicPr>
+            <a:picLocks noChangeAspect="1"/>
+          </p:cNvPicPr>
+          <p:nvPr/>
+        </p:nvPicPr>
+        <p:blipFill>
+          <a:blip r:embed="rId2">
+            <a:extLst>
+              <a:ext uri="{28A0092B-C50C-407E-A947-70E740481C1C}">
+                <a14:useLocalDpi xmlns:a14="http://schemas.microsoft.com/office/drawing/2010/main" val="0"/>
+              </a:ext>
+            </a:extLst>
+          </a:blip>
+          <a:stretch>
+            <a:fillRect/>
+          </a:stretch>
+        </p:blipFill>
+        <p:spPr>
+          <a:xfrm>
+            <a:off x="3276600" y="1752600"/>
+            <a:ext cx="2857500" cy="2209800"/>
+          </a:xfrm>
+          <a:prstGeom prst="rect">
+            <a:avLst/>
+          </a:prstGeom>
+        </p:spPr>
+      </p:pic>
+    </p:spTree>
+    <p:extLst>
+      <p:ext uri="{BB962C8B-B14F-4D97-AF65-F5344CB8AC3E}">
+        <p14:creationId xmlns:p14="http://schemas.microsoft.com/office/powerpoint/2010/main" val="1356735833"/>
       </p:ext>
     </p:extLst>
   </p:cSld>
@@ -3700,14 +4317,12 @@
         </p:nvSpPr>
         <p:spPr/>
         <p:txBody>
-          <a:bodyPr>
-            <a:normAutofit fontScale="90000"/>
-          </a:bodyPr>
+          <a:bodyPr/>
           <a:lstStyle/>
           <a:p>
             <a:r>
               <a:rPr lang="en-US" dirty="0" smtClean="0"/>
-              <a:t>Do Americans Love Their Automobiles?</a:t>
+              <a:t>Pitch</a:t>
             </a:r>
             <a:endParaRPr lang="en-US" dirty="0"/>
           </a:p>
@@ -3723,58 +4338,49 @@
             <p:ph idx="1"/>
           </p:nvPr>
         </p:nvSpPr>
-        <p:spPr>
-          <a:xfrm>
-            <a:off x="457200" y="1600201"/>
-            <a:ext cx="8229600" cy="1066800"/>
-          </a:xfrm>
-        </p:spPr>
-        <p:txBody>
-          <a:bodyPr/>
-          <a:lstStyle/>
-          <a:p>
+        <p:spPr/>
+        <p:txBody>
+          <a:bodyPr/>
+          <a:lstStyle/>
+          <a:p>
+            <a:pPr marL="0" indent="0">
+              <a:buNone/>
+            </a:pPr>
             <a:r>
               <a:rPr lang="en-US" dirty="0" smtClean="0"/>
-              <a:t>Let’s find out.</a:t>
-            </a:r>
+              <a:t>Team 2 would like to create an Android mobile app to help people keep their automobiles in good working order.  We would like to call this app the Automobile Maintenance App.</a:t>
+            </a:r>
+          </a:p>
+          <a:p>
+            <a:pPr marL="0" indent="0">
+              <a:buNone/>
+            </a:pPr>
             <a:endParaRPr lang="en-US" dirty="0"/>
           </a:p>
-        </p:txBody>
-      </p:sp>
-      <p:pic>
-        <p:nvPicPr>
-          <p:cNvPr id="4" name="Picture 3"/>
-          <p:cNvPicPr>
-            <a:picLocks noChangeAspect="1"/>
-          </p:cNvPicPr>
-          <p:nvPr/>
-        </p:nvPicPr>
-        <p:blipFill>
-          <a:blip r:embed="rId2">
-            <a:extLst>
-              <a:ext uri="{28A0092B-C50C-407E-A947-70E740481C1C}">
-                <a14:useLocalDpi xmlns:a14="http://schemas.microsoft.com/office/drawing/2010/main" val="0"/>
-              </a:ext>
-            </a:extLst>
-          </a:blip>
-          <a:stretch>
-            <a:fillRect/>
-          </a:stretch>
-        </p:blipFill>
-        <p:spPr>
-          <a:xfrm>
-            <a:off x="2286000" y="2133600"/>
-            <a:ext cx="4953000" cy="3733799"/>
-          </a:xfrm>
-          <a:prstGeom prst="rect">
-            <a:avLst/>
-          </a:prstGeom>
-        </p:spPr>
-      </p:pic>
+          <a:p>
+            <a:pPr marL="0" indent="0">
+              <a:buNone/>
+            </a:pPr>
+            <a:r>
+              <a:rPr lang="en-US" dirty="0" smtClean="0"/>
+              <a:t>The link for our Wiki is:</a:t>
+            </a:r>
+          </a:p>
+          <a:p>
+            <a:pPr marL="0" indent="0">
+              <a:buNone/>
+            </a:pPr>
+            <a:r>
+              <a:rPr lang="en-US" sz="2400" dirty="0"/>
+              <a:t>https://github.com/paceuniversity/cs6392015team2/wiki</a:t>
+            </a:r>
+          </a:p>
+        </p:txBody>
+      </p:sp>
     </p:spTree>
     <p:extLst>
       <p:ext uri="{BB962C8B-B14F-4D97-AF65-F5344CB8AC3E}">
-        <p14:creationId xmlns:p14="http://schemas.microsoft.com/office/powerpoint/2010/main" val="1253373518"/>
+        <p14:creationId xmlns:p14="http://schemas.microsoft.com/office/powerpoint/2010/main" val="2637896242"/>
       </p:ext>
     </p:extLst>
   </p:cSld>
@@ -3818,7 +4424,7 @@
           <a:p>
             <a:r>
               <a:rPr lang="en-US" dirty="0" smtClean="0"/>
-              <a:t>Passenger Vehicles in the U.S. </a:t>
+              <a:t>The Problem</a:t>
             </a:r>
             <a:endParaRPr lang="en-US" dirty="0"/>
           </a:p>
@@ -3837,57 +4443,29 @@
         <p:spPr>
           <a:xfrm>
             <a:off x="457200" y="1600201"/>
-            <a:ext cx="8229600" cy="2209799"/>
-          </a:xfrm>
-        </p:spPr>
-        <p:txBody>
-          <a:bodyPr/>
-          <a:lstStyle/>
-          <a:p>
-            <a:r>
-              <a:rPr lang="en-US" sz="2400" dirty="0"/>
-              <a:t>more passenger vehicle than any other </a:t>
-            </a:r>
-            <a:r>
-              <a:rPr lang="en-US" sz="2400" dirty="0" smtClean="0"/>
-              <a:t>country.</a:t>
-            </a:r>
-          </a:p>
-          <a:p>
-            <a:r>
-              <a:rPr lang="en-US" sz="2400" dirty="0" smtClean="0"/>
-              <a:t>354 million passenger vehicle.</a:t>
-            </a:r>
-          </a:p>
-          <a:p>
-            <a:r>
-              <a:rPr lang="en-US" sz="2400" dirty="0" smtClean="0"/>
-              <a:t>More </a:t>
-            </a:r>
-            <a:r>
-              <a:rPr lang="en-US" sz="2400" dirty="0"/>
-              <a:t>than one automobile for each person able to drive</a:t>
-            </a:r>
-            <a:endParaRPr lang="en-US" sz="2400" dirty="0" smtClean="0"/>
-          </a:p>
-          <a:p>
-            <a:r>
-              <a:rPr lang="en-US" sz="2400" dirty="0" smtClean="0"/>
-              <a:t>Growing </a:t>
-            </a:r>
-            <a:r>
-              <a:rPr lang="en-US" sz="2400" dirty="0"/>
-              <a:t>steadily since </a:t>
-            </a:r>
-            <a:r>
-              <a:rPr lang="en-US" sz="2400" dirty="0" smtClean="0"/>
-              <a:t>1960.</a:t>
-            </a:r>
-          </a:p>
-          <a:p>
-            <a:endParaRPr lang="en-US" dirty="0" smtClean="0"/>
-          </a:p>
-          <a:p>
+            <a:ext cx="8229600" cy="2971800"/>
+          </a:xfrm>
+        </p:spPr>
+        <p:txBody>
+          <a:bodyPr/>
+          <a:lstStyle/>
+          <a:p>
+            <a:r>
+              <a:rPr lang="en-US" dirty="0" smtClean="0"/>
+              <a:t>Too many people don’t regularly have their cars serviced.</a:t>
+            </a:r>
+          </a:p>
+          <a:p>
+            <a:r>
+              <a:rPr lang="en-US" dirty="0" smtClean="0"/>
+              <a:t>They spend too much on repairs.</a:t>
+            </a:r>
+          </a:p>
+          <a:p>
+            <a:r>
+              <a:rPr lang="en-US" dirty="0" smtClean="0"/>
+              <a:t>They don’t keep accurate records of their car’s service records. </a:t>
+            </a:r>
             <a:endParaRPr lang="en-US" dirty="0"/>
           </a:p>
         </p:txBody>
@@ -3914,8 +4492,8 @@
         </p:blipFill>
         <p:spPr>
           <a:xfrm>
-            <a:off x="2819400" y="3733800"/>
-            <a:ext cx="2895600" cy="2333625"/>
+            <a:off x="3790950" y="4772982"/>
+            <a:ext cx="1562100" cy="1133475"/>
           </a:xfrm>
           <a:prstGeom prst="rect">
             <a:avLst/>
@@ -3925,7 +4503,7 @@
     </p:spTree>
     <p:extLst>
       <p:ext uri="{BB962C8B-B14F-4D97-AF65-F5344CB8AC3E}">
-        <p14:creationId xmlns:p14="http://schemas.microsoft.com/office/powerpoint/2010/main" val="1267399545"/>
+        <p14:creationId xmlns:p14="http://schemas.microsoft.com/office/powerpoint/2010/main" val="269087369"/>
       </p:ext>
     </p:extLst>
   </p:cSld>
@@ -3964,12 +4542,14 @@
         </p:nvSpPr>
         <p:spPr/>
         <p:txBody>
-          <a:bodyPr/>
+          <a:bodyPr>
+            <a:normAutofit fontScale="90000"/>
+          </a:bodyPr>
           <a:lstStyle/>
           <a:p>
             <a:r>
               <a:rPr lang="en-US" dirty="0" smtClean="0"/>
-              <a:t>New Cars Sold Each Year</a:t>
+              <a:t>Do Americans Love Their Automobiles?</a:t>
             </a:r>
             <a:endParaRPr lang="en-US" dirty="0"/>
           </a:p>
@@ -3988,19 +4568,16 @@
         <p:spPr>
           <a:xfrm>
             <a:off x="457200" y="1600201"/>
-            <a:ext cx="8229600" cy="1524000"/>
-          </a:xfrm>
-        </p:spPr>
-        <p:txBody>
-          <a:bodyPr/>
-          <a:lstStyle/>
-          <a:p>
-            <a:pPr marL="0" indent="0">
-              <a:buNone/>
-            </a:pPr>
+            <a:ext cx="8229600" cy="1066800"/>
+          </a:xfrm>
+        </p:spPr>
+        <p:txBody>
+          <a:bodyPr/>
+          <a:lstStyle/>
+          <a:p>
             <a:r>
               <a:rPr lang="en-US" dirty="0" smtClean="0"/>
-              <a:t>12.8 million new cars sold in the U.S. in 2011, with an average price of $30,300.</a:t>
+              <a:t>Let’s find out.</a:t>
             </a:r>
             <a:endParaRPr lang="en-US" dirty="0"/>
           </a:p>
@@ -4028,158 +4605,8 @@
         </p:blipFill>
         <p:spPr>
           <a:xfrm>
-            <a:off x="1828735" y="3991010"/>
-            <a:ext cx="1524000" cy="1009650"/>
-          </a:xfrm>
-          <a:prstGeom prst="rect">
-            <a:avLst/>
-          </a:prstGeom>
-        </p:spPr>
-      </p:pic>
-      <p:pic>
-        <p:nvPicPr>
-          <p:cNvPr id="5" name="Picture 4"/>
-          <p:cNvPicPr>
-            <a:picLocks noChangeAspect="1"/>
-          </p:cNvPicPr>
-          <p:nvPr/>
-        </p:nvPicPr>
-        <p:blipFill>
-          <a:blip r:embed="rId3">
-            <a:extLst>
-              <a:ext uri="{28A0092B-C50C-407E-A947-70E740481C1C}">
-                <a14:useLocalDpi xmlns:a14="http://schemas.microsoft.com/office/drawing/2010/main" val="0"/>
-              </a:ext>
-            </a:extLst>
-          </a:blip>
-          <a:stretch>
-            <a:fillRect/>
-          </a:stretch>
-        </p:blipFill>
-        <p:spPr>
-          <a:xfrm>
-            <a:off x="5412417" y="4085832"/>
-            <a:ext cx="1533525" cy="1152525"/>
-          </a:xfrm>
-          <a:prstGeom prst="rect">
-            <a:avLst/>
-          </a:prstGeom>
-        </p:spPr>
-      </p:pic>
-      <p:pic>
-        <p:nvPicPr>
-          <p:cNvPr id="6" name="Picture 5"/>
-          <p:cNvPicPr>
-            <a:picLocks noChangeAspect="1"/>
-          </p:cNvPicPr>
-          <p:nvPr/>
-        </p:nvPicPr>
-        <p:blipFill>
-          <a:blip r:embed="rId4">
-            <a:extLst>
-              <a:ext uri="{28A0092B-C50C-407E-A947-70E740481C1C}">
-                <a14:useLocalDpi xmlns:a14="http://schemas.microsoft.com/office/drawing/2010/main" val="0"/>
-              </a:ext>
-            </a:extLst>
-          </a:blip>
-          <a:stretch>
-            <a:fillRect/>
-          </a:stretch>
-        </p:blipFill>
-        <p:spPr>
-          <a:xfrm>
-            <a:off x="5668727" y="5516790"/>
-            <a:ext cx="1076325" cy="895350"/>
-          </a:xfrm>
-          <a:prstGeom prst="rect">
-            <a:avLst/>
-          </a:prstGeom>
-        </p:spPr>
-      </p:pic>
-      <p:pic>
-        <p:nvPicPr>
-          <p:cNvPr id="7" name="Picture 6"/>
-          <p:cNvPicPr>
-            <a:picLocks noChangeAspect="1"/>
-          </p:cNvPicPr>
-          <p:nvPr/>
-        </p:nvPicPr>
-        <p:blipFill>
-          <a:blip r:embed="rId5">
-            <a:extLst>
-              <a:ext uri="{28A0092B-C50C-407E-A947-70E740481C1C}">
-                <a14:useLocalDpi xmlns:a14="http://schemas.microsoft.com/office/drawing/2010/main" val="0"/>
-              </a:ext>
-            </a:extLst>
-          </a:blip>
-          <a:stretch>
-            <a:fillRect/>
-          </a:stretch>
-        </p:blipFill>
-        <p:spPr>
-          <a:xfrm>
-            <a:off x="1862942" y="5438422"/>
-            <a:ext cx="1704975" cy="885825"/>
-          </a:xfrm>
-          <a:prstGeom prst="rect">
-            <a:avLst/>
-          </a:prstGeom>
-        </p:spPr>
-      </p:pic>
-      <p:pic>
-        <p:nvPicPr>
-          <p:cNvPr id="8" name="Picture 7"/>
-          <p:cNvPicPr>
-            <a:picLocks noChangeAspect="1"/>
-          </p:cNvPicPr>
-          <p:nvPr/>
-        </p:nvPicPr>
-        <p:blipFill>
-          <a:blip r:embed="rId6">
-            <a:extLst>
-              <a:ext uri="{28A0092B-C50C-407E-A947-70E740481C1C}">
-                <a14:useLocalDpi xmlns:a14="http://schemas.microsoft.com/office/drawing/2010/main" val="0"/>
-              </a:ext>
-            </a:extLst>
-          </a:blip>
-          <a:stretch>
-            <a:fillRect/>
-          </a:stretch>
-        </p:blipFill>
-        <p:spPr>
-          <a:xfrm>
-            <a:off x="4076700" y="5427600"/>
-            <a:ext cx="990600" cy="990600"/>
-          </a:xfrm>
-          <a:prstGeom prst="rect">
-            <a:avLst/>
-          </a:prstGeom>
-        </p:spPr>
-      </p:pic>
-      <p:pic>
-        <p:nvPicPr>
-          <p:cNvPr id="9" name="Picture 8"/>
-          <p:cNvPicPr>
-            <a:picLocks noChangeAspect="1"/>
-          </p:cNvPicPr>
-          <p:nvPr/>
-        </p:nvPicPr>
-        <p:blipFill>
-          <a:blip r:embed="rId7">
-            <a:extLst>
-              <a:ext uri="{28A0092B-C50C-407E-A947-70E740481C1C}">
-                <a14:useLocalDpi xmlns:a14="http://schemas.microsoft.com/office/drawing/2010/main" val="0"/>
-              </a:ext>
-            </a:extLst>
-          </a:blip>
-          <a:stretch>
-            <a:fillRect/>
-          </a:stretch>
-        </p:blipFill>
-        <p:spPr>
-          <a:xfrm>
-            <a:off x="3957637" y="4015687"/>
-            <a:ext cx="1228725" cy="904875"/>
+            <a:off x="2286000" y="2133600"/>
+            <a:ext cx="4953000" cy="3733799"/>
           </a:xfrm>
           <a:prstGeom prst="rect">
             <a:avLst/>
@@ -4189,7 +4616,7 @@
     </p:spTree>
     <p:extLst>
       <p:ext uri="{BB962C8B-B14F-4D97-AF65-F5344CB8AC3E}">
-        <p14:creationId xmlns:p14="http://schemas.microsoft.com/office/powerpoint/2010/main" val="2254351012"/>
+        <p14:creationId xmlns:p14="http://schemas.microsoft.com/office/powerpoint/2010/main" val="1253373518"/>
       </p:ext>
     </p:extLst>
   </p:cSld>
@@ -4233,7 +4660,7 @@
           <a:p>
             <a:r>
               <a:rPr lang="en-US" dirty="0" smtClean="0"/>
-              <a:t>U.S. Automotive Aftermarket</a:t>
+              <a:t>Passenger Vehicles in the U.S. </a:t>
             </a:r>
             <a:endParaRPr lang="en-US" dirty="0"/>
           </a:p>
@@ -4252,29 +4679,59 @@
         <p:spPr>
           <a:xfrm>
             <a:off x="457200" y="1600201"/>
-            <a:ext cx="8229600" cy="2209800"/>
-          </a:xfrm>
-        </p:spPr>
-        <p:txBody>
-          <a:bodyPr/>
-          <a:lstStyle/>
-          <a:p>
-            <a:r>
-              <a:rPr lang="en-US" dirty="0" smtClean="0"/>
-              <a:t>Estimated to be worth 318 billion.</a:t>
-            </a:r>
-          </a:p>
-          <a:p>
-            <a:r>
-              <a:rPr lang="en-US" dirty="0" smtClean="0"/>
-              <a:t>Contributes 2.3 % of GDP</a:t>
-            </a:r>
-          </a:p>
-          <a:p>
-            <a:r>
-              <a:rPr lang="en-US" dirty="0" smtClean="0"/>
-              <a:t>Employs 4.2 million people.</a:t>
-            </a:r>
+            <a:ext cx="8229600" cy="2209799"/>
+          </a:xfrm>
+        </p:spPr>
+        <p:txBody>
+          <a:bodyPr/>
+          <a:lstStyle/>
+          <a:p>
+            <a:r>
+              <a:rPr lang="en-US" sz="2400" dirty="0" smtClean="0"/>
+              <a:t>More </a:t>
+            </a:r>
+            <a:r>
+              <a:rPr lang="en-US" sz="2400" dirty="0"/>
+              <a:t>passenger vehicle than any other </a:t>
+            </a:r>
+            <a:r>
+              <a:rPr lang="en-US" sz="2400" dirty="0" smtClean="0"/>
+              <a:t>country.</a:t>
+            </a:r>
+          </a:p>
+          <a:p>
+            <a:r>
+              <a:rPr lang="en-US" sz="2400" dirty="0" smtClean="0"/>
+              <a:t>354 million passenger vehicle.</a:t>
+            </a:r>
+          </a:p>
+          <a:p>
+            <a:r>
+              <a:rPr lang="en-US" sz="2400" dirty="0" smtClean="0"/>
+              <a:t>More </a:t>
+            </a:r>
+            <a:r>
+              <a:rPr lang="en-US" sz="2400" dirty="0"/>
+              <a:t>than one automobile for each person able to drive</a:t>
+            </a:r>
+            <a:endParaRPr lang="en-US" sz="2400" dirty="0" smtClean="0"/>
+          </a:p>
+          <a:p>
+            <a:r>
+              <a:rPr lang="en-US" sz="2400" dirty="0" smtClean="0"/>
+              <a:t>Growing </a:t>
+            </a:r>
+            <a:r>
+              <a:rPr lang="en-US" sz="2400" dirty="0"/>
+              <a:t>steadily since </a:t>
+            </a:r>
+            <a:r>
+              <a:rPr lang="en-US" sz="2400" dirty="0" smtClean="0"/>
+              <a:t>1960.</a:t>
+            </a:r>
+          </a:p>
+          <a:p>
+            <a:endParaRPr lang="en-US" dirty="0" smtClean="0"/>
           </a:p>
           <a:p>
             <a:endParaRPr lang="en-US" dirty="0"/>
@@ -4303,8 +4760,8 @@
         </p:blipFill>
         <p:spPr>
           <a:xfrm>
-            <a:off x="1981200" y="3657600"/>
-            <a:ext cx="4214812" cy="2209800"/>
+            <a:off x="2819400" y="3733800"/>
+            <a:ext cx="2895600" cy="2333625"/>
           </a:xfrm>
           <a:prstGeom prst="rect">
             <a:avLst/>
@@ -4314,7 +4771,7 @@
     </p:spTree>
     <p:extLst>
       <p:ext uri="{BB962C8B-B14F-4D97-AF65-F5344CB8AC3E}">
-        <p14:creationId xmlns:p14="http://schemas.microsoft.com/office/powerpoint/2010/main" val="2324880503"/>
+        <p14:creationId xmlns:p14="http://schemas.microsoft.com/office/powerpoint/2010/main" val="1267399545"/>
       </p:ext>
     </p:extLst>
   </p:cSld>
@@ -4358,7 +4815,7 @@
           <a:p>
             <a:r>
               <a:rPr lang="en-US" dirty="0" smtClean="0"/>
-              <a:t>Auto Repair Shops</a:t>
+              <a:t>New Cars Sold Each Year</a:t>
             </a:r>
             <a:endParaRPr lang="en-US" dirty="0"/>
           </a:p>
@@ -4376,36 +4833,22 @@
         </p:nvSpPr>
         <p:spPr>
           <a:xfrm>
-            <a:off x="381000" y="3429000"/>
-            <a:ext cx="8229600" cy="2667000"/>
-          </a:xfrm>
-        </p:spPr>
-        <p:txBody>
-          <a:bodyPr/>
-          <a:lstStyle/>
-          <a:p>
+            <a:off x="457200" y="1600201"/>
+            <a:ext cx="8229600" cy="1524000"/>
+          </a:xfrm>
+        </p:spPr>
+        <p:txBody>
+          <a:bodyPr/>
+          <a:lstStyle/>
+          <a:p>
+            <a:pPr marL="0" indent="0">
+              <a:buNone/>
+            </a:pPr>
             <a:r>
               <a:rPr lang="en-US" dirty="0" smtClean="0"/>
-              <a:t>Almost </a:t>
-            </a:r>
-            <a:r>
-              <a:rPr lang="en-US" dirty="0"/>
-              <a:t>160,000 automobile repair shops employing 650,000 people, according to Auto Shop </a:t>
-            </a:r>
-            <a:r>
-              <a:rPr lang="en-US" dirty="0" smtClean="0"/>
-              <a:t>Online.</a:t>
-            </a:r>
-          </a:p>
-          <a:p>
-            <a:r>
-              <a:rPr lang="en-US" dirty="0" smtClean="0"/>
-              <a:t>Average </a:t>
-            </a:r>
-            <a:r>
-              <a:rPr lang="en-US" dirty="0"/>
-              <a:t>auto repair bill on the rise</a:t>
-            </a:r>
+              <a:t>12.8 million new cars sold in the U.S. in 2011, with an average price of $30,300.</a:t>
+            </a:r>
+            <a:endParaRPr lang="en-US" dirty="0"/>
           </a:p>
         </p:txBody>
       </p:sp>
@@ -4431,8 +4874,158 @@
         </p:blipFill>
         <p:spPr>
           <a:xfrm>
-            <a:off x="3781425" y="2017719"/>
-            <a:ext cx="1581150" cy="857250"/>
+            <a:off x="1828735" y="3991010"/>
+            <a:ext cx="1524000" cy="1009650"/>
+          </a:xfrm>
+          <a:prstGeom prst="rect">
+            <a:avLst/>
+          </a:prstGeom>
+        </p:spPr>
+      </p:pic>
+      <p:pic>
+        <p:nvPicPr>
+          <p:cNvPr id="5" name="Picture 4"/>
+          <p:cNvPicPr>
+            <a:picLocks noChangeAspect="1"/>
+          </p:cNvPicPr>
+          <p:nvPr/>
+        </p:nvPicPr>
+        <p:blipFill>
+          <a:blip r:embed="rId3">
+            <a:extLst>
+              <a:ext uri="{28A0092B-C50C-407E-A947-70E740481C1C}">
+                <a14:useLocalDpi xmlns:a14="http://schemas.microsoft.com/office/drawing/2010/main" val="0"/>
+              </a:ext>
+            </a:extLst>
+          </a:blip>
+          <a:stretch>
+            <a:fillRect/>
+          </a:stretch>
+        </p:blipFill>
+        <p:spPr>
+          <a:xfrm>
+            <a:off x="5412417" y="4085832"/>
+            <a:ext cx="1533525" cy="1152525"/>
+          </a:xfrm>
+          <a:prstGeom prst="rect">
+            <a:avLst/>
+          </a:prstGeom>
+        </p:spPr>
+      </p:pic>
+      <p:pic>
+        <p:nvPicPr>
+          <p:cNvPr id="6" name="Picture 5"/>
+          <p:cNvPicPr>
+            <a:picLocks noChangeAspect="1"/>
+          </p:cNvPicPr>
+          <p:nvPr/>
+        </p:nvPicPr>
+        <p:blipFill>
+          <a:blip r:embed="rId4">
+            <a:extLst>
+              <a:ext uri="{28A0092B-C50C-407E-A947-70E740481C1C}">
+                <a14:useLocalDpi xmlns:a14="http://schemas.microsoft.com/office/drawing/2010/main" val="0"/>
+              </a:ext>
+            </a:extLst>
+          </a:blip>
+          <a:stretch>
+            <a:fillRect/>
+          </a:stretch>
+        </p:blipFill>
+        <p:spPr>
+          <a:xfrm>
+            <a:off x="5668727" y="5516790"/>
+            <a:ext cx="1076325" cy="895350"/>
+          </a:xfrm>
+          <a:prstGeom prst="rect">
+            <a:avLst/>
+          </a:prstGeom>
+        </p:spPr>
+      </p:pic>
+      <p:pic>
+        <p:nvPicPr>
+          <p:cNvPr id="7" name="Picture 6"/>
+          <p:cNvPicPr>
+            <a:picLocks noChangeAspect="1"/>
+          </p:cNvPicPr>
+          <p:nvPr/>
+        </p:nvPicPr>
+        <p:blipFill>
+          <a:blip r:embed="rId5">
+            <a:extLst>
+              <a:ext uri="{28A0092B-C50C-407E-A947-70E740481C1C}">
+                <a14:useLocalDpi xmlns:a14="http://schemas.microsoft.com/office/drawing/2010/main" val="0"/>
+              </a:ext>
+            </a:extLst>
+          </a:blip>
+          <a:stretch>
+            <a:fillRect/>
+          </a:stretch>
+        </p:blipFill>
+        <p:spPr>
+          <a:xfrm>
+            <a:off x="1862942" y="5438422"/>
+            <a:ext cx="1704975" cy="885825"/>
+          </a:xfrm>
+          <a:prstGeom prst="rect">
+            <a:avLst/>
+          </a:prstGeom>
+        </p:spPr>
+      </p:pic>
+      <p:pic>
+        <p:nvPicPr>
+          <p:cNvPr id="8" name="Picture 7"/>
+          <p:cNvPicPr>
+            <a:picLocks noChangeAspect="1"/>
+          </p:cNvPicPr>
+          <p:nvPr/>
+        </p:nvPicPr>
+        <p:blipFill>
+          <a:blip r:embed="rId6">
+            <a:extLst>
+              <a:ext uri="{28A0092B-C50C-407E-A947-70E740481C1C}">
+                <a14:useLocalDpi xmlns:a14="http://schemas.microsoft.com/office/drawing/2010/main" val="0"/>
+              </a:ext>
+            </a:extLst>
+          </a:blip>
+          <a:stretch>
+            <a:fillRect/>
+          </a:stretch>
+        </p:blipFill>
+        <p:spPr>
+          <a:xfrm>
+            <a:off x="4076700" y="5427600"/>
+            <a:ext cx="990600" cy="990600"/>
+          </a:xfrm>
+          <a:prstGeom prst="rect">
+            <a:avLst/>
+          </a:prstGeom>
+        </p:spPr>
+      </p:pic>
+      <p:pic>
+        <p:nvPicPr>
+          <p:cNvPr id="9" name="Picture 8"/>
+          <p:cNvPicPr>
+            <a:picLocks noChangeAspect="1"/>
+          </p:cNvPicPr>
+          <p:nvPr/>
+        </p:nvPicPr>
+        <p:blipFill>
+          <a:blip r:embed="rId7">
+            <a:extLst>
+              <a:ext uri="{28A0092B-C50C-407E-A947-70E740481C1C}">
+                <a14:useLocalDpi xmlns:a14="http://schemas.microsoft.com/office/drawing/2010/main" val="0"/>
+              </a:ext>
+            </a:extLst>
+          </a:blip>
+          <a:stretch>
+            <a:fillRect/>
+          </a:stretch>
+        </p:blipFill>
+        <p:spPr>
+          <a:xfrm>
+            <a:off x="3957637" y="4015687"/>
+            <a:ext cx="1228725" cy="904875"/>
           </a:xfrm>
           <a:prstGeom prst="rect">
             <a:avLst/>
@@ -4442,7 +5035,7 @@
     </p:spTree>
     <p:extLst>
       <p:ext uri="{BB962C8B-B14F-4D97-AF65-F5344CB8AC3E}">
-        <p14:creationId xmlns:p14="http://schemas.microsoft.com/office/powerpoint/2010/main" val="4104201440"/>
+        <p14:creationId xmlns:p14="http://schemas.microsoft.com/office/powerpoint/2010/main" val="2254351012"/>
       </p:ext>
     </p:extLst>
   </p:cSld>
@@ -4486,15 +5079,57 @@
           <a:p>
             <a:r>
               <a:rPr lang="en-US" dirty="0" smtClean="0"/>
-              <a:t>But Cars Are Expensive</a:t>
-            </a:r>
+              <a:t>U.S. Automotive Aftermarket</a:t>
+            </a:r>
+            <a:endParaRPr lang="en-US" dirty="0"/>
+          </a:p>
+        </p:txBody>
+      </p:sp>
+      <p:sp>
+        <p:nvSpPr>
+          <p:cNvPr id="3" name="Content Placeholder 2"/>
+          <p:cNvSpPr>
+            <a:spLocks noGrp="1"/>
+          </p:cNvSpPr>
+          <p:nvPr>
+            <p:ph idx="1"/>
+          </p:nvPr>
+        </p:nvSpPr>
+        <p:spPr>
+          <a:xfrm>
+            <a:off x="457200" y="1600201"/>
+            <a:ext cx="8229600" cy="2209800"/>
+          </a:xfrm>
+        </p:spPr>
+        <p:txBody>
+          <a:bodyPr/>
+          <a:lstStyle/>
+          <a:p>
+            <a:r>
+              <a:rPr lang="en-US" dirty="0" smtClean="0"/>
+              <a:t>Estimated to be worth 318 billion.</a:t>
+            </a:r>
+          </a:p>
+          <a:p>
+            <a:r>
+              <a:rPr lang="en-US" dirty="0" smtClean="0"/>
+              <a:t>Contributes 2.3 % of GDP</a:t>
+            </a:r>
+          </a:p>
+          <a:p>
+            <a:r>
+              <a:rPr lang="en-US" dirty="0" smtClean="0"/>
+              <a:t>Employs 4.2 million people.</a:t>
+            </a:r>
+          </a:p>
+          <a:p>
             <a:endParaRPr lang="en-US" dirty="0"/>
           </a:p>
         </p:txBody>
       </p:sp>
       <p:pic>
         <p:nvPicPr>
-          <p:cNvPr id="5" name="Picture 4"/>
+          <p:cNvPr id="4" name="Picture 3"/>
           <p:cNvPicPr>
             <a:picLocks noChangeAspect="1"/>
           </p:cNvPicPr>
@@ -4514,8 +5149,8 @@
         </p:blipFill>
         <p:spPr>
           <a:xfrm>
-            <a:off x="1771259" y="1450811"/>
-            <a:ext cx="5601482" cy="4829849"/>
+            <a:off x="1981200" y="3657600"/>
+            <a:ext cx="4214812" cy="2209800"/>
           </a:xfrm>
           <a:prstGeom prst="rect">
             <a:avLst/>
@@ -4525,7 +5160,7 @@
     </p:spTree>
     <p:extLst>
       <p:ext uri="{BB962C8B-B14F-4D97-AF65-F5344CB8AC3E}">
-        <p14:creationId xmlns:p14="http://schemas.microsoft.com/office/powerpoint/2010/main" val="2370459147"/>
+        <p14:creationId xmlns:p14="http://schemas.microsoft.com/office/powerpoint/2010/main" val="2324880503"/>
       </p:ext>
     </p:extLst>
   </p:cSld>
@@ -4569,7 +5204,7 @@
           <a:p>
             <a:r>
               <a:rPr lang="en-US" dirty="0" smtClean="0"/>
-              <a:t>App Demographic</a:t>
+              <a:t>Auto Repair Shops</a:t>
             </a:r>
             <a:endParaRPr lang="en-US" dirty="0"/>
           </a:p>
@@ -4587,8 +5222,8 @@
         </p:nvSpPr>
         <p:spPr>
           <a:xfrm>
-            <a:off x="457200" y="1600201"/>
-            <a:ext cx="8229600" cy="2590800"/>
+            <a:off x="381000" y="3429000"/>
+            <a:ext cx="8229600" cy="2667000"/>
           </a:xfrm>
         </p:spPr>
         <p:txBody>
@@ -4597,15 +5232,26 @@
           <a:p>
             <a:r>
               <a:rPr lang="en-US" dirty="0" smtClean="0"/>
-              <a:t>Huge Demographic</a:t>
-            </a:r>
-          </a:p>
-          <a:p>
+              <a:t>Almost </a:t>
+            </a:r>
+            <a:r>
+              <a:rPr lang="en-US" dirty="0"/>
+              <a:t>160,000 automobile repair shops employing 650,000 people, according to Auto Shop </a:t>
+            </a:r>
             <a:r>
               <a:rPr lang="en-US" dirty="0" smtClean="0"/>
-              <a:t>Basically anyone that wished to keep their automobile in good working order, and wishes to save money on repair bills.</a:t>
-            </a:r>
-            <a:endParaRPr lang="en-US" dirty="0"/>
+              <a:t>Online.</a:t>
+            </a:r>
+          </a:p>
+          <a:p>
+            <a:r>
+              <a:rPr lang="en-US" dirty="0" smtClean="0"/>
+              <a:t>Average </a:t>
+            </a:r>
+            <a:r>
+              <a:rPr lang="en-US" dirty="0"/>
+              <a:t>auto repair bill on the rise</a:t>
+            </a:r>
           </a:p>
         </p:txBody>
       </p:sp>
@@ -4631,8 +5277,8 @@
         </p:blipFill>
         <p:spPr>
           <a:xfrm>
-            <a:off x="2641705" y="3684226"/>
-            <a:ext cx="4298741" cy="3211702"/>
+            <a:off x="3781425" y="2017719"/>
+            <a:ext cx="1581150" cy="857250"/>
           </a:xfrm>
           <a:prstGeom prst="rect">
             <a:avLst/>
@@ -4642,7 +5288,7 @@
     </p:spTree>
     <p:extLst>
       <p:ext uri="{BB962C8B-B14F-4D97-AF65-F5344CB8AC3E}">
-        <p14:creationId xmlns:p14="http://schemas.microsoft.com/office/powerpoint/2010/main" val="4147903026"/>
+        <p14:creationId xmlns:p14="http://schemas.microsoft.com/office/powerpoint/2010/main" val="4104201440"/>
       </p:ext>
     </p:extLst>
   </p:cSld>
@@ -4686,63 +5332,15 @@
           <a:p>
             <a:r>
               <a:rPr lang="en-US" dirty="0" smtClean="0"/>
-              <a:t>Typical User	</a:t>
-            </a:r>
-            <a:endParaRPr lang="en-US" dirty="0"/>
-          </a:p>
-        </p:txBody>
-      </p:sp>
-      <p:sp>
-        <p:nvSpPr>
-          <p:cNvPr id="3" name="Content Placeholder 2"/>
-          <p:cNvSpPr>
-            <a:spLocks noGrp="1"/>
-          </p:cNvSpPr>
-          <p:nvPr>
-            <p:ph idx="1"/>
-          </p:nvPr>
-        </p:nvSpPr>
-        <p:spPr>
-          <a:xfrm>
-            <a:off x="457200" y="1600201"/>
-            <a:ext cx="8229600" cy="2514600"/>
-          </a:xfrm>
-        </p:spPr>
-        <p:txBody>
-          <a:bodyPr/>
-          <a:lstStyle/>
-          <a:p>
-            <a:pPr marL="0" indent="0">
-              <a:buNone/>
-            </a:pPr>
-            <a:r>
-              <a:rPr lang="en-US" dirty="0" smtClean="0"/>
-              <a:t>Mike </a:t>
-            </a:r>
-            <a:r>
-              <a:rPr lang="en-US" dirty="0"/>
-              <a:t>is a hypothetical car owner.  He is proud of this 2010 Chevy </a:t>
-            </a:r>
-            <a:r>
-              <a:rPr lang="en-US" dirty="0" err="1"/>
-              <a:t>Comaro</a:t>
-            </a:r>
-            <a:r>
-              <a:rPr lang="en-US" dirty="0"/>
-              <a:t> and wants to keep it in perfect running order.  He would also like to save as much as possible on his auto repair bills.</a:t>
-            </a:r>
-          </a:p>
-          <a:p>
-            <a:pPr marL="0" indent="0">
-              <a:buNone/>
-            </a:pPr>
+              <a:t>But Cars Are Expensive</a:t>
+            </a:r>
             <a:endParaRPr lang="en-US" dirty="0"/>
           </a:p>
         </p:txBody>
       </p:sp>
       <p:pic>
         <p:nvPicPr>
-          <p:cNvPr id="4" name="Picture 3"/>
+          <p:cNvPr id="5" name="Picture 4"/>
           <p:cNvPicPr>
             <a:picLocks noChangeAspect="1"/>
           </p:cNvPicPr>
@@ -4762,8 +5360,8 @@
         </p:blipFill>
         <p:spPr>
           <a:xfrm>
-            <a:off x="3509962" y="4527958"/>
-            <a:ext cx="2124075" cy="1104900"/>
+            <a:off x="1771259" y="1450811"/>
+            <a:ext cx="5601482" cy="4829849"/>
           </a:xfrm>
           <a:prstGeom prst="rect">
             <a:avLst/>
@@ -4773,7 +5371,7 @@
     </p:spTree>
     <p:extLst>
       <p:ext uri="{BB962C8B-B14F-4D97-AF65-F5344CB8AC3E}">
-        <p14:creationId xmlns:p14="http://schemas.microsoft.com/office/powerpoint/2010/main" val="3413720117"/>
+        <p14:creationId xmlns:p14="http://schemas.microsoft.com/office/powerpoint/2010/main" val="2370459147"/>
       </p:ext>
     </p:extLst>
   </p:cSld>

</xml_diff>